<commit_message>
improve in-place installation description from comments
</commit_message>
<xml_diff>
--- a/VEEPortingGuide/multisandbox.pptx
+++ b/VEEPortingGuide/multisandbox.pptx
@@ -221,7 +221,7 @@
               <a:rPr lang="fr-FR" smtClean="0">
                 <a:latin typeface="Calibri Regular" charset="0"/>
               </a:rPr>
-              <a:t>lundi 21 novembre 2022</a:t>
+              <a:t>jeudi 30 mars 2023</a:t>
             </a:fld>
             <a:endParaRPr lang="en-US" dirty="0">
               <a:latin typeface="Calibri Regular" charset="0"/>
@@ -399,7 +399,7 @@
           <a:p>
             <a:fld id="{885721CF-495B-2B41-A23A-4D3221F80235}" type="datetime2">
               <a:rPr lang="fr-FR" smtClean="0"/>
-              <a:t>lundi 21 novembre 2022</a:t>
+              <a:t>jeudi 30 mars 2023</a:t>
             </a:fld>
             <a:endParaRPr lang="en-US" dirty="0"/>
           </a:p>
@@ -1298,7 +1298,7 @@
           <p:cNvPr id="7" name="Text Placeholder 2">
             <a:extLst>
               <a:ext uri="{FF2B5EF4-FFF2-40B4-BE49-F238E27FC236}">
-                <a16:creationId xmlns:a16="http://schemas.microsoft.com/office/drawing/2014/main" xmlns="" id="{EE9EA528-AAC2-D34E-8538-0A0AAD80AD96}"/>
+                <a16:creationId xmlns="" xmlns:a16="http://schemas.microsoft.com/office/drawing/2014/main" id="{EE9EA528-AAC2-D34E-8538-0A0AAD80AD96}"/>
               </a:ext>
             </a:extLst>
           </p:cNvPr>
@@ -1384,7 +1384,7 @@
           <p:cNvPr id="10" name="Content Placeholder 3">
             <a:extLst>
               <a:ext uri="{FF2B5EF4-FFF2-40B4-BE49-F238E27FC236}">
-                <a16:creationId xmlns:a16="http://schemas.microsoft.com/office/drawing/2014/main" xmlns="" id="{DAF8326C-6710-4047-962C-1C0A0F78FFB5}"/>
+                <a16:creationId xmlns="" xmlns:a16="http://schemas.microsoft.com/office/drawing/2014/main" id="{DAF8326C-6710-4047-962C-1C0A0F78FFB5}"/>
               </a:ext>
             </a:extLst>
           </p:cNvPr>
@@ -2107,7 +2107,7 @@
           <p:cNvPr id="7" name="Text Placeholder 2">
             <a:extLst>
               <a:ext uri="{FF2B5EF4-FFF2-40B4-BE49-F238E27FC236}">
-                <a16:creationId xmlns:a16="http://schemas.microsoft.com/office/drawing/2014/main" xmlns="" id="{BADF2A12-0EA6-EC4F-864C-2E94AC36ADCE}"/>
+                <a16:creationId xmlns="" xmlns:a16="http://schemas.microsoft.com/office/drawing/2014/main" id="{BADF2A12-0EA6-EC4F-864C-2E94AC36ADCE}"/>
               </a:ext>
             </a:extLst>
           </p:cNvPr>
@@ -2962,7 +2962,7 @@
           <p:cNvPr id="7" name="Content Placeholder 3">
             <a:extLst>
               <a:ext uri="{FF2B5EF4-FFF2-40B4-BE49-F238E27FC236}">
-                <a16:creationId xmlns:a16="http://schemas.microsoft.com/office/drawing/2014/main" xmlns="" id="{2E4978A6-AF2C-644A-9245-7D0BA4E8B6CE}"/>
+                <a16:creationId xmlns="" xmlns:a16="http://schemas.microsoft.com/office/drawing/2014/main" id="{2E4978A6-AF2C-644A-9245-7D0BA4E8B6CE}"/>
               </a:ext>
             </a:extLst>
           </p:cNvPr>
@@ -3374,7 +3374,7 @@
           <p:cNvPr id="7" name="Text Placeholder 2">
             <a:extLst>
               <a:ext uri="{FF2B5EF4-FFF2-40B4-BE49-F238E27FC236}">
-                <a16:creationId xmlns:a16="http://schemas.microsoft.com/office/drawing/2014/main" xmlns="" id="{BADF2A12-0EA6-EC4F-864C-2E94AC36ADCE}"/>
+                <a16:creationId xmlns="" xmlns:a16="http://schemas.microsoft.com/office/drawing/2014/main" id="{BADF2A12-0EA6-EC4F-864C-2E94AC36ADCE}"/>
               </a:ext>
             </a:extLst>
           </p:cNvPr>
@@ -4363,7 +4363,7 @@
           <p:cNvPr id="13" name="Rectangle 12">
             <a:extLst>
               <a:ext uri="{FF2B5EF4-FFF2-40B4-BE49-F238E27FC236}">
-                <a16:creationId xmlns:a16="http://schemas.microsoft.com/office/drawing/2014/main" xmlns="" id="{200F2B4F-ED74-D84B-A5FF-644A79E13221}"/>
+                <a16:creationId xmlns="" xmlns:a16="http://schemas.microsoft.com/office/drawing/2014/main" id="{200F2B4F-ED74-D84B-A5FF-644A79E13221}"/>
               </a:ext>
             </a:extLst>
           </p:cNvPr>
@@ -4603,7 +4603,7 @@
           <p:cNvPr id="14" name="Footer Placeholder 5">
             <a:extLst>
               <a:ext uri="{FF2B5EF4-FFF2-40B4-BE49-F238E27FC236}">
-                <a16:creationId xmlns:a16="http://schemas.microsoft.com/office/drawing/2014/main" xmlns="" id="{9D0AEA00-A11E-E447-A27D-E3693067A9E6}"/>
+                <a16:creationId xmlns="" xmlns:a16="http://schemas.microsoft.com/office/drawing/2014/main" id="{9D0AEA00-A11E-E447-A27D-E3693067A9E6}"/>
               </a:ext>
             </a:extLst>
           </p:cNvPr>
@@ -4659,7 +4659,7 @@
           <p:cNvPr id="16" name="Picture 2" descr="C:\Users\cmorineau\Marketing-Private\Marcom\Graphics\Artwork_Corp\Logos\Logo-microej-grey-h50.png">
             <a:extLst>
               <a:ext uri="{FF2B5EF4-FFF2-40B4-BE49-F238E27FC236}">
-                <a16:creationId xmlns:a16="http://schemas.microsoft.com/office/drawing/2014/main" xmlns="" id="{75E7AEDB-C69E-AA4C-96BC-8D040A4C81DB}"/>
+                <a16:creationId xmlns="" xmlns:a16="http://schemas.microsoft.com/office/drawing/2014/main" id="{75E7AEDB-C69E-AA4C-96BC-8D040A4C81DB}"/>
               </a:ext>
             </a:extLst>
           </p:cNvPr>
@@ -4842,7 +4842,7 @@
           <p:cNvPr id="11" name="Picture 10">
             <a:extLst>
               <a:ext uri="{FF2B5EF4-FFF2-40B4-BE49-F238E27FC236}">
-                <a16:creationId xmlns:a16="http://schemas.microsoft.com/office/drawing/2014/main" xmlns="" id="{21EA2856-E9E7-8D44-8863-70888E0D7F19}"/>
+                <a16:creationId xmlns="" xmlns:a16="http://schemas.microsoft.com/office/drawing/2014/main" id="{21EA2856-E9E7-8D44-8863-70888E0D7F19}"/>
               </a:ext>
             </a:extLst>
           </p:cNvPr>
@@ -4878,7 +4878,7 @@
           <p:cNvPr id="15" name="Title Placeholder 1">
             <a:extLst>
               <a:ext uri="{FF2B5EF4-FFF2-40B4-BE49-F238E27FC236}">
-                <a16:creationId xmlns:a16="http://schemas.microsoft.com/office/drawing/2014/main" xmlns="" id="{ED4F756F-313C-9A45-AA9F-4637139720F4}"/>
+                <a16:creationId xmlns="" xmlns:a16="http://schemas.microsoft.com/office/drawing/2014/main" id="{ED4F756F-313C-9A45-AA9F-4637139720F4}"/>
               </a:ext>
             </a:extLst>
           </p:cNvPr>
@@ -4933,7 +4933,7 @@
           <p:cNvPr id="16" name="Picture 15">
             <a:extLst>
               <a:ext uri="{FF2B5EF4-FFF2-40B4-BE49-F238E27FC236}">
-                <a16:creationId xmlns:a16="http://schemas.microsoft.com/office/drawing/2014/main" xmlns="" id="{A9288502-3773-1F4B-A16F-58C59F5FD419}"/>
+                <a16:creationId xmlns="" xmlns:a16="http://schemas.microsoft.com/office/drawing/2014/main" id="{A9288502-3773-1F4B-A16F-58C59F5FD419}"/>
               </a:ext>
             </a:extLst>
           </p:cNvPr>
@@ -4969,7 +4969,7 @@
           <p:cNvPr id="32" name="Straight Connector 31">
             <a:extLst>
               <a:ext uri="{FF2B5EF4-FFF2-40B4-BE49-F238E27FC236}">
-                <a16:creationId xmlns:a16="http://schemas.microsoft.com/office/drawing/2014/main" xmlns="" id="{158023E0-65D2-F849-83D8-A55E2AC6BB63}"/>
+                <a16:creationId xmlns="" xmlns:a16="http://schemas.microsoft.com/office/drawing/2014/main" id="{158023E0-65D2-F849-83D8-A55E2AC6BB63}"/>
               </a:ext>
             </a:extLst>
           </p:cNvPr>
@@ -5007,7 +5007,7 @@
           <p:cNvPr id="36" name="Straight Connector 35">
             <a:extLst>
               <a:ext uri="{FF2B5EF4-FFF2-40B4-BE49-F238E27FC236}">
-                <a16:creationId xmlns:a16="http://schemas.microsoft.com/office/drawing/2014/main" xmlns="" id="{1C61BB10-90B1-A04F-AB02-727027D1950C}"/>
+                <a16:creationId xmlns="" xmlns:a16="http://schemas.microsoft.com/office/drawing/2014/main" id="{1C61BB10-90B1-A04F-AB02-727027D1950C}"/>
               </a:ext>
             </a:extLst>
           </p:cNvPr>
@@ -5050,7 +5050,7 @@
           <p:cNvPr id="37" name="Content Placeholder 3">
             <a:extLst>
               <a:ext uri="{FF2B5EF4-FFF2-40B4-BE49-F238E27FC236}">
-                <a16:creationId xmlns:a16="http://schemas.microsoft.com/office/drawing/2014/main" xmlns="" id="{E6FA2AB0-B1DC-CE4F-BA00-6F224EAE5B8E}"/>
+                <a16:creationId xmlns="" xmlns:a16="http://schemas.microsoft.com/office/drawing/2014/main" id="{E6FA2AB0-B1DC-CE4F-BA00-6F224EAE5B8E}"/>
               </a:ext>
             </a:extLst>
           </p:cNvPr>
@@ -5146,7 +5146,7 @@
           <p:cNvPr id="17" name="Content Placeholder 3">
             <a:extLst>
               <a:ext uri="{FF2B5EF4-FFF2-40B4-BE49-F238E27FC236}">
-                <a16:creationId xmlns:a16="http://schemas.microsoft.com/office/drawing/2014/main" xmlns="" id="{A143064D-45EC-0A4F-88C5-9640D09D7651}"/>
+                <a16:creationId xmlns="" xmlns:a16="http://schemas.microsoft.com/office/drawing/2014/main" id="{A143064D-45EC-0A4F-88C5-9640D09D7651}"/>
               </a:ext>
             </a:extLst>
           </p:cNvPr>
@@ -5777,7 +5777,7 @@
           <p:cNvPr id="8" name="Rectangle 7">
             <a:extLst>
               <a:ext uri="{FF2B5EF4-FFF2-40B4-BE49-F238E27FC236}">
-                <a16:creationId xmlns:a16="http://schemas.microsoft.com/office/drawing/2014/main" xmlns="" id="{6524FE37-B1D2-9A48-8EE1-B9816DBDEF3D}"/>
+                <a16:creationId xmlns="" xmlns:a16="http://schemas.microsoft.com/office/drawing/2014/main" id="{6524FE37-B1D2-9A48-8EE1-B9816DBDEF3D}"/>
               </a:ext>
             </a:extLst>
           </p:cNvPr>
@@ -5816,7 +5816,7 @@
           <p:cNvPr id="9" name="TextBox 8">
             <a:extLst>
               <a:ext uri="{FF2B5EF4-FFF2-40B4-BE49-F238E27FC236}">
-                <a16:creationId xmlns:a16="http://schemas.microsoft.com/office/drawing/2014/main" xmlns="" id="{46ADA988-EDE2-EB43-9964-F5CB85382BA1}"/>
+                <a16:creationId xmlns="" xmlns:a16="http://schemas.microsoft.com/office/drawing/2014/main" id="{46ADA988-EDE2-EB43-9964-F5CB85382BA1}"/>
               </a:ext>
             </a:extLst>
           </p:cNvPr>
@@ -6055,7 +6055,7 @@
           <p:cNvPr id="12" name="Straight Connector 11">
             <a:extLst>
               <a:ext uri="{FF2B5EF4-FFF2-40B4-BE49-F238E27FC236}">
-                <a16:creationId xmlns:a16="http://schemas.microsoft.com/office/drawing/2014/main" xmlns="" id="{80782101-745C-B64C-BF8C-0612C8A826F4}"/>
+                <a16:creationId xmlns="" xmlns:a16="http://schemas.microsoft.com/office/drawing/2014/main" id="{80782101-745C-B64C-BF8C-0612C8A826F4}"/>
               </a:ext>
             </a:extLst>
           </p:cNvPr>
@@ -6222,7 +6222,7 @@
           <p:cNvPr id="11" name="Rectangle 10">
             <a:extLst>
               <a:ext uri="{FF2B5EF4-FFF2-40B4-BE49-F238E27FC236}">
-                <a16:creationId xmlns:a16="http://schemas.microsoft.com/office/drawing/2014/main" xmlns="" id="{1A60FEF2-2730-8045-B797-AEA6DA2ED07B}"/>
+                <a16:creationId xmlns="" xmlns:a16="http://schemas.microsoft.com/office/drawing/2014/main" id="{1A60FEF2-2730-8045-B797-AEA6DA2ED07B}"/>
               </a:ext>
             </a:extLst>
           </p:cNvPr>
@@ -6258,7 +6258,7 @@
           <p:cNvPr id="12" name="Straight Connector 11">
             <a:extLst>
               <a:ext uri="{FF2B5EF4-FFF2-40B4-BE49-F238E27FC236}">
-                <a16:creationId xmlns:a16="http://schemas.microsoft.com/office/drawing/2014/main" xmlns="" id="{9FC44B9B-3ED3-CD4D-A4B4-670F9A0707A7}"/>
+                <a16:creationId xmlns="" xmlns:a16="http://schemas.microsoft.com/office/drawing/2014/main" id="{9FC44B9B-3ED3-CD4D-A4B4-670F9A0707A7}"/>
               </a:ext>
             </a:extLst>
           </p:cNvPr>
@@ -6294,7 +6294,7 @@
           <p:cNvPr id="13" name="Rectangle 12">
             <a:extLst>
               <a:ext uri="{FF2B5EF4-FFF2-40B4-BE49-F238E27FC236}">
-                <a16:creationId xmlns:a16="http://schemas.microsoft.com/office/drawing/2014/main" xmlns="" id="{A8E9047D-CEE7-1041-9CD2-438580517A8B}"/>
+                <a16:creationId xmlns="" xmlns:a16="http://schemas.microsoft.com/office/drawing/2014/main" id="{A8E9047D-CEE7-1041-9CD2-438580517A8B}"/>
               </a:ext>
             </a:extLst>
           </p:cNvPr>
@@ -6330,7 +6330,7 @@
           <p:cNvPr id="14" name="Straight Connector 13">
             <a:extLst>
               <a:ext uri="{FF2B5EF4-FFF2-40B4-BE49-F238E27FC236}">
-                <a16:creationId xmlns:a16="http://schemas.microsoft.com/office/drawing/2014/main" xmlns="" id="{A080B88E-5B35-9C42-B51A-25732C333881}"/>
+                <a16:creationId xmlns="" xmlns:a16="http://schemas.microsoft.com/office/drawing/2014/main" id="{A080B88E-5B35-9C42-B51A-25732C333881}"/>
               </a:ext>
             </a:extLst>
           </p:cNvPr>
@@ -6366,7 +6366,7 @@
           <p:cNvPr id="16" name="TextBox 15">
             <a:extLst>
               <a:ext uri="{FF2B5EF4-FFF2-40B4-BE49-F238E27FC236}">
-                <a16:creationId xmlns:a16="http://schemas.microsoft.com/office/drawing/2014/main" xmlns="" id="{B2BB3227-C774-FD42-B9A5-3508452E6A71}"/>
+                <a16:creationId xmlns="" xmlns:a16="http://schemas.microsoft.com/office/drawing/2014/main" id="{B2BB3227-C774-FD42-B9A5-3508452E6A71}"/>
               </a:ext>
             </a:extLst>
           </p:cNvPr>
@@ -6673,7 +6673,7 @@
           <p:cNvPr id="86" name="Rectangle 85">
             <a:extLst>
               <a:ext uri="{FF2B5EF4-FFF2-40B4-BE49-F238E27FC236}">
-                <a16:creationId xmlns:a16="http://schemas.microsoft.com/office/drawing/2014/main" xmlns="" id="{EDB109D6-5BF6-5E42-A1C1-45B238B41A7E}"/>
+                <a16:creationId xmlns="" xmlns:a16="http://schemas.microsoft.com/office/drawing/2014/main" id="{EDB109D6-5BF6-5E42-A1C1-45B238B41A7E}"/>
               </a:ext>
             </a:extLst>
           </p:cNvPr>
@@ -6735,7 +6735,7 @@
           <p:cNvPr id="45" name="Rectangle 1">
             <a:extLst>
               <a:ext uri="{FF2B5EF4-FFF2-40B4-BE49-F238E27FC236}">
-                <a16:creationId xmlns:a16="http://schemas.microsoft.com/office/drawing/2014/main" xmlns="" id="{7F24C5F6-F280-EE49-BEC1-D93D2617D356}"/>
+                <a16:creationId xmlns="" xmlns:a16="http://schemas.microsoft.com/office/drawing/2014/main" id="{7F24C5F6-F280-EE49-BEC1-D93D2617D356}"/>
               </a:ext>
             </a:extLst>
           </p:cNvPr>
@@ -6984,7 +6984,7 @@
           <p:cNvPr id="89" name="Rectangle 88">
             <a:extLst>
               <a:ext uri="{FF2B5EF4-FFF2-40B4-BE49-F238E27FC236}">
-                <a16:creationId xmlns:a16="http://schemas.microsoft.com/office/drawing/2014/main" xmlns="" id="{EFCB9C4D-5246-B743-853A-FA66CEE7DE4D}"/>
+                <a16:creationId xmlns="" xmlns:a16="http://schemas.microsoft.com/office/drawing/2014/main" id="{EFCB9C4D-5246-B743-853A-FA66CEE7DE4D}"/>
               </a:ext>
             </a:extLst>
           </p:cNvPr>
@@ -7036,7 +7036,7 @@
           <p:cNvPr id="93" name="Triangle 92">
             <a:extLst>
               <a:ext uri="{FF2B5EF4-FFF2-40B4-BE49-F238E27FC236}">
-                <a16:creationId xmlns:a16="http://schemas.microsoft.com/office/drawing/2014/main" xmlns="" id="{0D72A147-C32E-C540-8F80-59F865637BB1}"/>
+                <a16:creationId xmlns="" xmlns:a16="http://schemas.microsoft.com/office/drawing/2014/main" id="{0D72A147-C32E-C540-8F80-59F865637BB1}"/>
               </a:ext>
             </a:extLst>
           </p:cNvPr>
@@ -7091,7 +7091,7 @@
             <a:hlinkClick r:id="rId2"/>
             <a:extLst>
               <a:ext uri="{FF2B5EF4-FFF2-40B4-BE49-F238E27FC236}">
-                <a16:creationId xmlns:a16="http://schemas.microsoft.com/office/drawing/2014/main" xmlns="" id="{0A03D419-B4E4-A341-8258-BAF4FC5373B4}"/>
+                <a16:creationId xmlns="" xmlns:a16="http://schemas.microsoft.com/office/drawing/2014/main" id="{0A03D419-B4E4-A341-8258-BAF4FC5373B4}"/>
               </a:ext>
             </a:extLst>
           </p:cNvPr>
@@ -7154,7 +7154,7 @@
           <p:cNvPr id="95" name="Group 94">
             <a:extLst>
               <a:ext uri="{FF2B5EF4-FFF2-40B4-BE49-F238E27FC236}">
-                <a16:creationId xmlns:a16="http://schemas.microsoft.com/office/drawing/2014/main" xmlns="" id="{89E75E57-B1BB-1043-92B1-2837059A39CF}"/>
+                <a16:creationId xmlns="" xmlns:a16="http://schemas.microsoft.com/office/drawing/2014/main" id="{89E75E57-B1BB-1043-92B1-2837059A39CF}"/>
               </a:ext>
             </a:extLst>
           </p:cNvPr>
@@ -7174,7 +7174,7 @@
             <p:cNvPr id="96" name="Rounded Rectangle 95">
               <a:extLst>
                 <a:ext uri="{FF2B5EF4-FFF2-40B4-BE49-F238E27FC236}">
-                  <a16:creationId xmlns:a16="http://schemas.microsoft.com/office/drawing/2014/main" xmlns="" id="{C571F53C-F9A8-D34F-89E9-D59834F26F2A}"/>
+                  <a16:creationId xmlns="" xmlns:a16="http://schemas.microsoft.com/office/drawing/2014/main" id="{C571F53C-F9A8-D34F-89E9-D59834F26F2A}"/>
                 </a:ext>
               </a:extLst>
             </p:cNvPr>
@@ -7227,7 +7227,7 @@
               <a:hlinkClick r:id="rId3"/>
               <a:extLst>
                 <a:ext uri="{FF2B5EF4-FFF2-40B4-BE49-F238E27FC236}">
-                  <a16:creationId xmlns:a16="http://schemas.microsoft.com/office/drawing/2014/main" xmlns="" id="{BCCC18FD-7037-504F-B7DD-009E93D5CFC5}"/>
+                  <a16:creationId xmlns="" xmlns:a16="http://schemas.microsoft.com/office/drawing/2014/main" id="{BCCC18FD-7037-504F-B7DD-009E93D5CFC5}"/>
                 </a:ext>
               </a:extLst>
             </p:cNvPr>
@@ -7279,7 +7279,7 @@
             <a:hlinkClick r:id="rId3"/>
             <a:extLst>
               <a:ext uri="{FF2B5EF4-FFF2-40B4-BE49-F238E27FC236}">
-                <a16:creationId xmlns:a16="http://schemas.microsoft.com/office/drawing/2014/main" xmlns="" id="{31AA4A0D-C979-ED41-9053-191689A53F33}"/>
+                <a16:creationId xmlns="" xmlns:a16="http://schemas.microsoft.com/office/drawing/2014/main" id="{31AA4A0D-C979-ED41-9053-191689A53F33}"/>
               </a:ext>
             </a:extLst>
           </p:cNvPr>
@@ -7342,7 +7342,7 @@
           <p:cNvPr id="105" name="Group 104">
             <a:extLst>
               <a:ext uri="{FF2B5EF4-FFF2-40B4-BE49-F238E27FC236}">
-                <a16:creationId xmlns:a16="http://schemas.microsoft.com/office/drawing/2014/main" xmlns="" id="{7BF00640-0851-4A4E-8179-1BD384D8F525}"/>
+                <a16:creationId xmlns="" xmlns:a16="http://schemas.microsoft.com/office/drawing/2014/main" id="{7BF00640-0851-4A4E-8179-1BD384D8F525}"/>
               </a:ext>
             </a:extLst>
           </p:cNvPr>
@@ -7362,7 +7362,7 @@
             <p:cNvPr id="106" name="Rounded Rectangle 105">
               <a:extLst>
                 <a:ext uri="{FF2B5EF4-FFF2-40B4-BE49-F238E27FC236}">
-                  <a16:creationId xmlns:a16="http://schemas.microsoft.com/office/drawing/2014/main" xmlns="" id="{5AA2B150-5004-364C-910A-A392CD7A853A}"/>
+                  <a16:creationId xmlns="" xmlns:a16="http://schemas.microsoft.com/office/drawing/2014/main" id="{5AA2B150-5004-364C-910A-A392CD7A853A}"/>
                 </a:ext>
               </a:extLst>
             </p:cNvPr>
@@ -7415,7 +7415,7 @@
               <a:hlinkClick r:id="rId3"/>
               <a:extLst>
                 <a:ext uri="{FF2B5EF4-FFF2-40B4-BE49-F238E27FC236}">
-                  <a16:creationId xmlns:a16="http://schemas.microsoft.com/office/drawing/2014/main" xmlns="" id="{91AD4506-A6D6-124C-97E7-7D3DF0EBA900}"/>
+                  <a16:creationId xmlns="" xmlns:a16="http://schemas.microsoft.com/office/drawing/2014/main" id="{91AD4506-A6D6-124C-97E7-7D3DF0EBA900}"/>
                 </a:ext>
               </a:extLst>
             </p:cNvPr>
@@ -7474,7 +7474,7 @@
           <p:cNvPr id="122" name="Picture 121">
             <a:extLst>
               <a:ext uri="{FF2B5EF4-FFF2-40B4-BE49-F238E27FC236}">
-                <a16:creationId xmlns:a16="http://schemas.microsoft.com/office/drawing/2014/main" xmlns="" id="{B221A555-3C2F-E94D-96E4-6FC85564B891}"/>
+                <a16:creationId xmlns="" xmlns:a16="http://schemas.microsoft.com/office/drawing/2014/main" id="{B221A555-3C2F-E94D-96E4-6FC85564B891}"/>
               </a:ext>
             </a:extLst>
           </p:cNvPr>
@@ -7510,7 +7510,7 @@
           <p:cNvPr id="129" name="Title 24">
             <a:extLst>
               <a:ext uri="{FF2B5EF4-FFF2-40B4-BE49-F238E27FC236}">
-                <a16:creationId xmlns:a16="http://schemas.microsoft.com/office/drawing/2014/main" xmlns="" id="{C9C5C095-FA83-CE44-8BA2-FB0F4CF430D7}"/>
+                <a16:creationId xmlns="" xmlns:a16="http://schemas.microsoft.com/office/drawing/2014/main" id="{C9C5C095-FA83-CE44-8BA2-FB0F4CF430D7}"/>
               </a:ext>
             </a:extLst>
           </p:cNvPr>
@@ -7570,7 +7570,7 @@
           <p:cNvPr id="134" name="Picture 133">
             <a:extLst>
               <a:ext uri="{FF2B5EF4-FFF2-40B4-BE49-F238E27FC236}">
-                <a16:creationId xmlns:a16="http://schemas.microsoft.com/office/drawing/2014/main" xmlns="" id="{0E8E09F9-EF0B-4C47-B695-BE4EBAFCE677}"/>
+                <a16:creationId xmlns="" xmlns:a16="http://schemas.microsoft.com/office/drawing/2014/main" id="{0E8E09F9-EF0B-4C47-B695-BE4EBAFCE677}"/>
               </a:ext>
             </a:extLst>
           </p:cNvPr>
@@ -7605,7 +7605,7 @@
           <p:cNvPr id="135" name="Straight Connector 134">
             <a:extLst>
               <a:ext uri="{FF2B5EF4-FFF2-40B4-BE49-F238E27FC236}">
-                <a16:creationId xmlns:a16="http://schemas.microsoft.com/office/drawing/2014/main" xmlns="" id="{FF6AB179-2926-4D40-A4DD-8BB1E9EAEA7D}"/>
+                <a16:creationId xmlns="" xmlns:a16="http://schemas.microsoft.com/office/drawing/2014/main" id="{FF6AB179-2926-4D40-A4DD-8BB1E9EAEA7D}"/>
               </a:ext>
             </a:extLst>
           </p:cNvPr>
@@ -7646,7 +7646,7 @@
           <p:cNvPr id="41" name="Content Placeholder 52">
             <a:extLst>
               <a:ext uri="{FF2B5EF4-FFF2-40B4-BE49-F238E27FC236}">
-                <a16:creationId xmlns:a16="http://schemas.microsoft.com/office/drawing/2014/main" xmlns="" id="{03870E7E-5F8D-F64D-B6CF-AC70B18948A2}"/>
+                <a16:creationId xmlns="" xmlns:a16="http://schemas.microsoft.com/office/drawing/2014/main" id="{03870E7E-5F8D-F64D-B6CF-AC70B18948A2}"/>
               </a:ext>
             </a:extLst>
           </p:cNvPr>
@@ -7896,7 +7896,7 @@
           <p:cNvPr id="42" name="Content Placeholder 52">
             <a:extLst>
               <a:ext uri="{FF2B5EF4-FFF2-40B4-BE49-F238E27FC236}">
-                <a16:creationId xmlns:a16="http://schemas.microsoft.com/office/drawing/2014/main" xmlns="" id="{95FE5B9D-9272-3841-9EE5-9D5A046A1FF7}"/>
+                <a16:creationId xmlns="" xmlns:a16="http://schemas.microsoft.com/office/drawing/2014/main" id="{95FE5B9D-9272-3841-9EE5-9D5A046A1FF7}"/>
               </a:ext>
             </a:extLst>
           </p:cNvPr>
@@ -8132,7 +8132,7 @@
           <p:cNvPr id="43" name="Content Placeholder 52">
             <a:extLst>
               <a:ext uri="{FF2B5EF4-FFF2-40B4-BE49-F238E27FC236}">
-                <a16:creationId xmlns:a16="http://schemas.microsoft.com/office/drawing/2014/main" xmlns="" id="{8C3392A2-7BEC-C643-A397-ACB0C15BDDE1}"/>
+                <a16:creationId xmlns="" xmlns:a16="http://schemas.microsoft.com/office/drawing/2014/main" id="{8C3392A2-7BEC-C643-A397-ACB0C15BDDE1}"/>
               </a:ext>
             </a:extLst>
           </p:cNvPr>
@@ -8367,7 +8367,7 @@
           <p:cNvPr id="44" name="Content Placeholder 52">
             <a:extLst>
               <a:ext uri="{FF2B5EF4-FFF2-40B4-BE49-F238E27FC236}">
-                <a16:creationId xmlns:a16="http://schemas.microsoft.com/office/drawing/2014/main" xmlns="" id="{5BF202D4-4239-7E4F-93CD-8E57B0E44847}"/>
+                <a16:creationId xmlns="" xmlns:a16="http://schemas.microsoft.com/office/drawing/2014/main" id="{5BF202D4-4239-7E4F-93CD-8E57B0E44847}"/>
               </a:ext>
             </a:extLst>
           </p:cNvPr>
@@ -8611,7 +8611,7 @@
           <p:cNvPr id="46" name="Content Placeholder 52">
             <a:extLst>
               <a:ext uri="{FF2B5EF4-FFF2-40B4-BE49-F238E27FC236}">
-                <a16:creationId xmlns:a16="http://schemas.microsoft.com/office/drawing/2014/main" xmlns="" id="{16FDB233-B738-8D4E-B43F-750A1A983DE9}"/>
+                <a16:creationId xmlns="" xmlns:a16="http://schemas.microsoft.com/office/drawing/2014/main" id="{16FDB233-B738-8D4E-B43F-750A1A983DE9}"/>
               </a:ext>
             </a:extLst>
           </p:cNvPr>
@@ -8847,7 +8847,7 @@
           <p:cNvPr id="47" name="Picture 46">
             <a:extLst>
               <a:ext uri="{FF2B5EF4-FFF2-40B4-BE49-F238E27FC236}">
-                <a16:creationId xmlns:a16="http://schemas.microsoft.com/office/drawing/2014/main" xmlns="" id="{E394D0E0-025D-644F-82A2-ED215AC1B381}"/>
+                <a16:creationId xmlns="" xmlns:a16="http://schemas.microsoft.com/office/drawing/2014/main" id="{E394D0E0-025D-644F-82A2-ED215AC1B381}"/>
               </a:ext>
             </a:extLst>
           </p:cNvPr>
@@ -8883,7 +8883,7 @@
           <p:cNvPr id="48" name="Picture 47">
             <a:extLst>
               <a:ext uri="{FF2B5EF4-FFF2-40B4-BE49-F238E27FC236}">
-                <a16:creationId xmlns:a16="http://schemas.microsoft.com/office/drawing/2014/main" xmlns="" id="{35E0AA7F-0EA4-224A-92F8-C9A9D5B1B802}"/>
+                <a16:creationId xmlns="" xmlns:a16="http://schemas.microsoft.com/office/drawing/2014/main" id="{35E0AA7F-0EA4-224A-92F8-C9A9D5B1B802}"/>
               </a:ext>
             </a:extLst>
           </p:cNvPr>
@@ -8919,7 +8919,7 @@
           <p:cNvPr id="49" name="Picture 48">
             <a:extLst>
               <a:ext uri="{FF2B5EF4-FFF2-40B4-BE49-F238E27FC236}">
-                <a16:creationId xmlns:a16="http://schemas.microsoft.com/office/drawing/2014/main" xmlns="" id="{A48092AC-915B-524D-9672-FE0826E130E7}"/>
+                <a16:creationId xmlns="" xmlns:a16="http://schemas.microsoft.com/office/drawing/2014/main" id="{A48092AC-915B-524D-9672-FE0826E130E7}"/>
               </a:ext>
             </a:extLst>
           </p:cNvPr>
@@ -8955,7 +8955,7 @@
           <p:cNvPr id="51" name="Picture 50">
             <a:extLst>
               <a:ext uri="{FF2B5EF4-FFF2-40B4-BE49-F238E27FC236}">
-                <a16:creationId xmlns:a16="http://schemas.microsoft.com/office/drawing/2014/main" xmlns="" id="{27E440A9-1FB1-A44A-8917-F3A839BAF906}"/>
+                <a16:creationId xmlns="" xmlns:a16="http://schemas.microsoft.com/office/drawing/2014/main" id="{27E440A9-1FB1-A44A-8917-F3A839BAF906}"/>
               </a:ext>
             </a:extLst>
           </p:cNvPr>
@@ -8991,7 +8991,7 @@
           <p:cNvPr id="52" name="Picture 51">
             <a:extLst>
               <a:ext uri="{FF2B5EF4-FFF2-40B4-BE49-F238E27FC236}">
-                <a16:creationId xmlns:a16="http://schemas.microsoft.com/office/drawing/2014/main" xmlns="" id="{FFFF220F-F683-2F48-A73D-6A41401B0D05}"/>
+                <a16:creationId xmlns="" xmlns:a16="http://schemas.microsoft.com/office/drawing/2014/main" id="{FFFF220F-F683-2F48-A73D-6A41401B0D05}"/>
               </a:ext>
             </a:extLst>
           </p:cNvPr>
@@ -9027,7 +9027,7 @@
           <p:cNvPr id="53" name="Picture 52">
             <a:extLst>
               <a:ext uri="{FF2B5EF4-FFF2-40B4-BE49-F238E27FC236}">
-                <a16:creationId xmlns:a16="http://schemas.microsoft.com/office/drawing/2014/main" xmlns="" id="{FC96BF3C-2C18-7E4E-AADA-8075C799317A}"/>
+                <a16:creationId xmlns="" xmlns:a16="http://schemas.microsoft.com/office/drawing/2014/main" id="{FC96BF3C-2C18-7E4E-AADA-8075C799317A}"/>
               </a:ext>
             </a:extLst>
           </p:cNvPr>
@@ -9063,7 +9063,7 @@
           <p:cNvPr id="54" name="Content Placeholder 52">
             <a:extLst>
               <a:ext uri="{FF2B5EF4-FFF2-40B4-BE49-F238E27FC236}">
-                <a16:creationId xmlns:a16="http://schemas.microsoft.com/office/drawing/2014/main" xmlns="" id="{8184E9DC-A05F-994B-8D0E-6F0964DE93A1}"/>
+                <a16:creationId xmlns="" xmlns:a16="http://schemas.microsoft.com/office/drawing/2014/main" id="{8184E9DC-A05F-994B-8D0E-6F0964DE93A1}"/>
               </a:ext>
             </a:extLst>
           </p:cNvPr>
@@ -9328,7 +9328,7 @@
           <p:cNvPr id="37" name="Content Placeholder 52">
             <a:extLst>
               <a:ext uri="{FF2B5EF4-FFF2-40B4-BE49-F238E27FC236}">
-                <a16:creationId xmlns:a16="http://schemas.microsoft.com/office/drawing/2014/main" xmlns="" id="{A1F29D74-7F07-D84E-B102-930FD141E5B9}"/>
+                <a16:creationId xmlns="" xmlns:a16="http://schemas.microsoft.com/office/drawing/2014/main" id="{A1F29D74-7F07-D84E-B102-930FD141E5B9}"/>
               </a:ext>
             </a:extLst>
           </p:cNvPr>
@@ -9564,7 +9564,7 @@
           <p:cNvPr id="38" name="Picture 37">
             <a:extLst>
               <a:ext uri="{FF2B5EF4-FFF2-40B4-BE49-F238E27FC236}">
-                <a16:creationId xmlns:a16="http://schemas.microsoft.com/office/drawing/2014/main" xmlns="" id="{B4EE7BA3-3882-054B-9C71-4C6C9D45BBC3}"/>
+                <a16:creationId xmlns="" xmlns:a16="http://schemas.microsoft.com/office/drawing/2014/main" id="{B4EE7BA3-3882-054B-9C71-4C6C9D45BBC3}"/>
               </a:ext>
             </a:extLst>
           </p:cNvPr>
@@ -9601,7 +9601,7 @@
             <a:hlinkClick r:id="rId3"/>
             <a:extLst>
               <a:ext uri="{FF2B5EF4-FFF2-40B4-BE49-F238E27FC236}">
-                <a16:creationId xmlns:a16="http://schemas.microsoft.com/office/drawing/2014/main" xmlns="" id="{8ECC0D63-20D7-0343-86D0-A87AE2BB8F87}"/>
+                <a16:creationId xmlns="" xmlns:a16="http://schemas.microsoft.com/office/drawing/2014/main" id="{8ECC0D63-20D7-0343-86D0-A87AE2BB8F87}"/>
               </a:ext>
             </a:extLst>
           </p:cNvPr>
@@ -9660,7 +9660,7 @@
             <a:hlinkClick r:id="rId2"/>
             <a:extLst>
               <a:ext uri="{FF2B5EF4-FFF2-40B4-BE49-F238E27FC236}">
-                <a16:creationId xmlns:a16="http://schemas.microsoft.com/office/drawing/2014/main" xmlns="" id="{B01DB6F7-4A56-E648-8CE4-FB8C132141F4}"/>
+                <a16:creationId xmlns="" xmlns:a16="http://schemas.microsoft.com/office/drawing/2014/main" id="{B01DB6F7-4A56-E648-8CE4-FB8C132141F4}"/>
               </a:ext>
             </a:extLst>
           </p:cNvPr>
@@ -9748,7 +9748,7 @@
           <p:cNvPr id="86" name="Rectangle 85">
             <a:extLst>
               <a:ext uri="{FF2B5EF4-FFF2-40B4-BE49-F238E27FC236}">
-                <a16:creationId xmlns:a16="http://schemas.microsoft.com/office/drawing/2014/main" xmlns="" id="{EDB109D6-5BF6-5E42-A1C1-45B238B41A7E}"/>
+                <a16:creationId xmlns="" xmlns:a16="http://schemas.microsoft.com/office/drawing/2014/main" id="{EDB109D6-5BF6-5E42-A1C1-45B238B41A7E}"/>
               </a:ext>
             </a:extLst>
           </p:cNvPr>
@@ -9810,7 +9810,7 @@
           <p:cNvPr id="131" name="Rectangle 1">
             <a:extLst>
               <a:ext uri="{FF2B5EF4-FFF2-40B4-BE49-F238E27FC236}">
-                <a16:creationId xmlns:a16="http://schemas.microsoft.com/office/drawing/2014/main" xmlns="" id="{D03E41E1-380E-DF4A-8F15-AB2EAE2322B9}"/>
+                <a16:creationId xmlns="" xmlns:a16="http://schemas.microsoft.com/office/drawing/2014/main" id="{D03E41E1-380E-DF4A-8F15-AB2EAE2322B9}"/>
               </a:ext>
             </a:extLst>
           </p:cNvPr>
@@ -10059,7 +10059,7 @@
           <p:cNvPr id="89" name="Rectangle 88">
             <a:extLst>
               <a:ext uri="{FF2B5EF4-FFF2-40B4-BE49-F238E27FC236}">
-                <a16:creationId xmlns:a16="http://schemas.microsoft.com/office/drawing/2014/main" xmlns="" id="{EFCB9C4D-5246-B743-853A-FA66CEE7DE4D}"/>
+                <a16:creationId xmlns="" xmlns:a16="http://schemas.microsoft.com/office/drawing/2014/main" id="{EFCB9C4D-5246-B743-853A-FA66CEE7DE4D}"/>
               </a:ext>
             </a:extLst>
           </p:cNvPr>
@@ -10111,7 +10111,7 @@
           <p:cNvPr id="93" name="Triangle 92">
             <a:extLst>
               <a:ext uri="{FF2B5EF4-FFF2-40B4-BE49-F238E27FC236}">
-                <a16:creationId xmlns:a16="http://schemas.microsoft.com/office/drawing/2014/main" xmlns="" id="{0D72A147-C32E-C540-8F80-59F865637BB1}"/>
+                <a16:creationId xmlns="" xmlns:a16="http://schemas.microsoft.com/office/drawing/2014/main" id="{0D72A147-C32E-C540-8F80-59F865637BB1}"/>
               </a:ext>
             </a:extLst>
           </p:cNvPr>
@@ -10166,7 +10166,7 @@
             <a:hlinkClick r:id="rId2"/>
             <a:extLst>
               <a:ext uri="{FF2B5EF4-FFF2-40B4-BE49-F238E27FC236}">
-                <a16:creationId xmlns:a16="http://schemas.microsoft.com/office/drawing/2014/main" xmlns="" id="{0A03D419-B4E4-A341-8258-BAF4FC5373B4}"/>
+                <a16:creationId xmlns="" xmlns:a16="http://schemas.microsoft.com/office/drawing/2014/main" id="{0A03D419-B4E4-A341-8258-BAF4FC5373B4}"/>
               </a:ext>
             </a:extLst>
           </p:cNvPr>
@@ -10229,7 +10229,7 @@
           <p:cNvPr id="95" name="Group 94">
             <a:extLst>
               <a:ext uri="{FF2B5EF4-FFF2-40B4-BE49-F238E27FC236}">
-                <a16:creationId xmlns:a16="http://schemas.microsoft.com/office/drawing/2014/main" xmlns="" id="{89E75E57-B1BB-1043-92B1-2837059A39CF}"/>
+                <a16:creationId xmlns="" xmlns:a16="http://schemas.microsoft.com/office/drawing/2014/main" id="{89E75E57-B1BB-1043-92B1-2837059A39CF}"/>
               </a:ext>
             </a:extLst>
           </p:cNvPr>
@@ -10249,7 +10249,7 @@
             <p:cNvPr id="96" name="Rounded Rectangle 95">
               <a:extLst>
                 <a:ext uri="{FF2B5EF4-FFF2-40B4-BE49-F238E27FC236}">
-                  <a16:creationId xmlns:a16="http://schemas.microsoft.com/office/drawing/2014/main" xmlns="" id="{C571F53C-F9A8-D34F-89E9-D59834F26F2A}"/>
+                  <a16:creationId xmlns="" xmlns:a16="http://schemas.microsoft.com/office/drawing/2014/main" id="{C571F53C-F9A8-D34F-89E9-D59834F26F2A}"/>
                 </a:ext>
               </a:extLst>
             </p:cNvPr>
@@ -10302,7 +10302,7 @@
               <a:hlinkClick r:id="rId3"/>
               <a:extLst>
                 <a:ext uri="{FF2B5EF4-FFF2-40B4-BE49-F238E27FC236}">
-                  <a16:creationId xmlns:a16="http://schemas.microsoft.com/office/drawing/2014/main" xmlns="" id="{BCCC18FD-7037-504F-B7DD-009E93D5CFC5}"/>
+                  <a16:creationId xmlns="" xmlns:a16="http://schemas.microsoft.com/office/drawing/2014/main" id="{BCCC18FD-7037-504F-B7DD-009E93D5CFC5}"/>
                 </a:ext>
               </a:extLst>
             </p:cNvPr>
@@ -10354,7 +10354,7 @@
             <a:hlinkClick r:id="rId3"/>
             <a:extLst>
               <a:ext uri="{FF2B5EF4-FFF2-40B4-BE49-F238E27FC236}">
-                <a16:creationId xmlns:a16="http://schemas.microsoft.com/office/drawing/2014/main" xmlns="" id="{31AA4A0D-C979-ED41-9053-191689A53F33}"/>
+                <a16:creationId xmlns="" xmlns:a16="http://schemas.microsoft.com/office/drawing/2014/main" id="{31AA4A0D-C979-ED41-9053-191689A53F33}"/>
               </a:ext>
             </a:extLst>
           </p:cNvPr>
@@ -10417,7 +10417,7 @@
           <p:cNvPr id="105" name="Group 104">
             <a:extLst>
               <a:ext uri="{FF2B5EF4-FFF2-40B4-BE49-F238E27FC236}">
-                <a16:creationId xmlns:a16="http://schemas.microsoft.com/office/drawing/2014/main" xmlns="" id="{7BF00640-0851-4A4E-8179-1BD384D8F525}"/>
+                <a16:creationId xmlns="" xmlns:a16="http://schemas.microsoft.com/office/drawing/2014/main" id="{7BF00640-0851-4A4E-8179-1BD384D8F525}"/>
               </a:ext>
             </a:extLst>
           </p:cNvPr>
@@ -10437,7 +10437,7 @@
             <p:cNvPr id="106" name="Rounded Rectangle 105">
               <a:extLst>
                 <a:ext uri="{FF2B5EF4-FFF2-40B4-BE49-F238E27FC236}">
-                  <a16:creationId xmlns:a16="http://schemas.microsoft.com/office/drawing/2014/main" xmlns="" id="{5AA2B150-5004-364C-910A-A392CD7A853A}"/>
+                  <a16:creationId xmlns="" xmlns:a16="http://schemas.microsoft.com/office/drawing/2014/main" id="{5AA2B150-5004-364C-910A-A392CD7A853A}"/>
                 </a:ext>
               </a:extLst>
             </p:cNvPr>
@@ -10490,7 +10490,7 @@
               <a:hlinkClick r:id="rId3"/>
               <a:extLst>
                 <a:ext uri="{FF2B5EF4-FFF2-40B4-BE49-F238E27FC236}">
-                  <a16:creationId xmlns:a16="http://schemas.microsoft.com/office/drawing/2014/main" xmlns="" id="{91AD4506-A6D6-124C-97E7-7D3DF0EBA900}"/>
+                  <a16:creationId xmlns="" xmlns:a16="http://schemas.microsoft.com/office/drawing/2014/main" id="{91AD4506-A6D6-124C-97E7-7D3DF0EBA900}"/>
                 </a:ext>
               </a:extLst>
             </p:cNvPr>
@@ -10549,7 +10549,7 @@
           <p:cNvPr id="122" name="Picture 121">
             <a:extLst>
               <a:ext uri="{FF2B5EF4-FFF2-40B4-BE49-F238E27FC236}">
-                <a16:creationId xmlns:a16="http://schemas.microsoft.com/office/drawing/2014/main" xmlns="" id="{B221A555-3C2F-E94D-96E4-6FC85564B891}"/>
+                <a16:creationId xmlns="" xmlns:a16="http://schemas.microsoft.com/office/drawing/2014/main" id="{B221A555-3C2F-E94D-96E4-6FC85564B891}"/>
               </a:ext>
             </a:extLst>
           </p:cNvPr>
@@ -10585,7 +10585,7 @@
           <p:cNvPr id="129" name="Title 24">
             <a:extLst>
               <a:ext uri="{FF2B5EF4-FFF2-40B4-BE49-F238E27FC236}">
-                <a16:creationId xmlns:a16="http://schemas.microsoft.com/office/drawing/2014/main" xmlns="" id="{C9C5C095-FA83-CE44-8BA2-FB0F4CF430D7}"/>
+                <a16:creationId xmlns="" xmlns:a16="http://schemas.microsoft.com/office/drawing/2014/main" id="{C9C5C095-FA83-CE44-8BA2-FB0F4CF430D7}"/>
               </a:ext>
             </a:extLst>
           </p:cNvPr>
@@ -10645,7 +10645,7 @@
           <p:cNvPr id="135" name="Straight Connector 134">
             <a:extLst>
               <a:ext uri="{FF2B5EF4-FFF2-40B4-BE49-F238E27FC236}">
-                <a16:creationId xmlns:a16="http://schemas.microsoft.com/office/drawing/2014/main" xmlns="" id="{FF6AB179-2926-4D40-A4DD-8BB1E9EAEA7D}"/>
+                <a16:creationId xmlns="" xmlns:a16="http://schemas.microsoft.com/office/drawing/2014/main" id="{FF6AB179-2926-4D40-A4DD-8BB1E9EAEA7D}"/>
               </a:ext>
             </a:extLst>
           </p:cNvPr>
@@ -10686,7 +10686,7 @@
           <p:cNvPr id="41" name="Content Placeholder 52">
             <a:extLst>
               <a:ext uri="{FF2B5EF4-FFF2-40B4-BE49-F238E27FC236}">
-                <a16:creationId xmlns:a16="http://schemas.microsoft.com/office/drawing/2014/main" xmlns="" id="{03870E7E-5F8D-F64D-B6CF-AC70B18948A2}"/>
+                <a16:creationId xmlns="" xmlns:a16="http://schemas.microsoft.com/office/drawing/2014/main" id="{03870E7E-5F8D-F64D-B6CF-AC70B18948A2}"/>
               </a:ext>
             </a:extLst>
           </p:cNvPr>
@@ -10936,7 +10936,7 @@
           <p:cNvPr id="42" name="Content Placeholder 52">
             <a:extLst>
               <a:ext uri="{FF2B5EF4-FFF2-40B4-BE49-F238E27FC236}">
-                <a16:creationId xmlns:a16="http://schemas.microsoft.com/office/drawing/2014/main" xmlns="" id="{95FE5B9D-9272-3841-9EE5-9D5A046A1FF7}"/>
+                <a16:creationId xmlns="" xmlns:a16="http://schemas.microsoft.com/office/drawing/2014/main" id="{95FE5B9D-9272-3841-9EE5-9D5A046A1FF7}"/>
               </a:ext>
             </a:extLst>
           </p:cNvPr>
@@ -11172,7 +11172,7 @@
           <p:cNvPr id="43" name="Content Placeholder 52">
             <a:extLst>
               <a:ext uri="{FF2B5EF4-FFF2-40B4-BE49-F238E27FC236}">
-                <a16:creationId xmlns:a16="http://schemas.microsoft.com/office/drawing/2014/main" xmlns="" id="{8C3392A2-7BEC-C643-A397-ACB0C15BDDE1}"/>
+                <a16:creationId xmlns="" xmlns:a16="http://schemas.microsoft.com/office/drawing/2014/main" id="{8C3392A2-7BEC-C643-A397-ACB0C15BDDE1}"/>
               </a:ext>
             </a:extLst>
           </p:cNvPr>
@@ -11407,7 +11407,7 @@
           <p:cNvPr id="44" name="Content Placeholder 52">
             <a:extLst>
               <a:ext uri="{FF2B5EF4-FFF2-40B4-BE49-F238E27FC236}">
-                <a16:creationId xmlns:a16="http://schemas.microsoft.com/office/drawing/2014/main" xmlns="" id="{5BF202D4-4239-7E4F-93CD-8E57B0E44847}"/>
+                <a16:creationId xmlns="" xmlns:a16="http://schemas.microsoft.com/office/drawing/2014/main" id="{5BF202D4-4239-7E4F-93CD-8E57B0E44847}"/>
               </a:ext>
             </a:extLst>
           </p:cNvPr>
@@ -11651,7 +11651,7 @@
           <p:cNvPr id="46" name="Content Placeholder 52">
             <a:extLst>
               <a:ext uri="{FF2B5EF4-FFF2-40B4-BE49-F238E27FC236}">
-                <a16:creationId xmlns:a16="http://schemas.microsoft.com/office/drawing/2014/main" xmlns="" id="{16FDB233-B738-8D4E-B43F-750A1A983DE9}"/>
+                <a16:creationId xmlns="" xmlns:a16="http://schemas.microsoft.com/office/drawing/2014/main" id="{16FDB233-B738-8D4E-B43F-750A1A983DE9}"/>
               </a:ext>
             </a:extLst>
           </p:cNvPr>
@@ -11887,7 +11887,7 @@
           <p:cNvPr id="47" name="Picture 46">
             <a:extLst>
               <a:ext uri="{FF2B5EF4-FFF2-40B4-BE49-F238E27FC236}">
-                <a16:creationId xmlns:a16="http://schemas.microsoft.com/office/drawing/2014/main" xmlns="" id="{E394D0E0-025D-644F-82A2-ED215AC1B381}"/>
+                <a16:creationId xmlns="" xmlns:a16="http://schemas.microsoft.com/office/drawing/2014/main" id="{E394D0E0-025D-644F-82A2-ED215AC1B381}"/>
               </a:ext>
             </a:extLst>
           </p:cNvPr>
@@ -11923,7 +11923,7 @@
           <p:cNvPr id="48" name="Picture 47">
             <a:extLst>
               <a:ext uri="{FF2B5EF4-FFF2-40B4-BE49-F238E27FC236}">
-                <a16:creationId xmlns:a16="http://schemas.microsoft.com/office/drawing/2014/main" xmlns="" id="{35E0AA7F-0EA4-224A-92F8-C9A9D5B1B802}"/>
+                <a16:creationId xmlns="" xmlns:a16="http://schemas.microsoft.com/office/drawing/2014/main" id="{35E0AA7F-0EA4-224A-92F8-C9A9D5B1B802}"/>
               </a:ext>
             </a:extLst>
           </p:cNvPr>
@@ -11959,7 +11959,7 @@
           <p:cNvPr id="49" name="Picture 48">
             <a:extLst>
               <a:ext uri="{FF2B5EF4-FFF2-40B4-BE49-F238E27FC236}">
-                <a16:creationId xmlns:a16="http://schemas.microsoft.com/office/drawing/2014/main" xmlns="" id="{A48092AC-915B-524D-9672-FE0826E130E7}"/>
+                <a16:creationId xmlns="" xmlns:a16="http://schemas.microsoft.com/office/drawing/2014/main" id="{A48092AC-915B-524D-9672-FE0826E130E7}"/>
               </a:ext>
             </a:extLst>
           </p:cNvPr>
@@ -11995,7 +11995,7 @@
           <p:cNvPr id="51" name="Picture 50">
             <a:extLst>
               <a:ext uri="{FF2B5EF4-FFF2-40B4-BE49-F238E27FC236}">
-                <a16:creationId xmlns:a16="http://schemas.microsoft.com/office/drawing/2014/main" xmlns="" id="{27E440A9-1FB1-A44A-8917-F3A839BAF906}"/>
+                <a16:creationId xmlns="" xmlns:a16="http://schemas.microsoft.com/office/drawing/2014/main" id="{27E440A9-1FB1-A44A-8917-F3A839BAF906}"/>
               </a:ext>
             </a:extLst>
           </p:cNvPr>
@@ -12031,7 +12031,7 @@
           <p:cNvPr id="52" name="Picture 51">
             <a:extLst>
               <a:ext uri="{FF2B5EF4-FFF2-40B4-BE49-F238E27FC236}">
-                <a16:creationId xmlns:a16="http://schemas.microsoft.com/office/drawing/2014/main" xmlns="" id="{FFFF220F-F683-2F48-A73D-6A41401B0D05}"/>
+                <a16:creationId xmlns="" xmlns:a16="http://schemas.microsoft.com/office/drawing/2014/main" id="{FFFF220F-F683-2F48-A73D-6A41401B0D05}"/>
               </a:ext>
             </a:extLst>
           </p:cNvPr>
@@ -12067,7 +12067,7 @@
           <p:cNvPr id="53" name="Picture 52">
             <a:extLst>
               <a:ext uri="{FF2B5EF4-FFF2-40B4-BE49-F238E27FC236}">
-                <a16:creationId xmlns:a16="http://schemas.microsoft.com/office/drawing/2014/main" xmlns="" id="{FC96BF3C-2C18-7E4E-AADA-8075C799317A}"/>
+                <a16:creationId xmlns="" xmlns:a16="http://schemas.microsoft.com/office/drawing/2014/main" id="{FC96BF3C-2C18-7E4E-AADA-8075C799317A}"/>
               </a:ext>
             </a:extLst>
           </p:cNvPr>
@@ -12103,7 +12103,7 @@
           <p:cNvPr id="54" name="Content Placeholder 52">
             <a:extLst>
               <a:ext uri="{FF2B5EF4-FFF2-40B4-BE49-F238E27FC236}">
-                <a16:creationId xmlns:a16="http://schemas.microsoft.com/office/drawing/2014/main" xmlns="" id="{8184E9DC-A05F-994B-8D0E-6F0964DE93A1}"/>
+                <a16:creationId xmlns="" xmlns:a16="http://schemas.microsoft.com/office/drawing/2014/main" id="{8184E9DC-A05F-994B-8D0E-6F0964DE93A1}"/>
               </a:ext>
             </a:extLst>
           </p:cNvPr>
@@ -12368,7 +12368,7 @@
           <p:cNvPr id="37" name="Content Placeholder 52">
             <a:extLst>
               <a:ext uri="{FF2B5EF4-FFF2-40B4-BE49-F238E27FC236}">
-                <a16:creationId xmlns:a16="http://schemas.microsoft.com/office/drawing/2014/main" xmlns="" id="{A1F29D74-7F07-D84E-B102-930FD141E5B9}"/>
+                <a16:creationId xmlns="" xmlns:a16="http://schemas.microsoft.com/office/drawing/2014/main" id="{A1F29D74-7F07-D84E-B102-930FD141E5B9}"/>
               </a:ext>
             </a:extLst>
           </p:cNvPr>
@@ -12604,7 +12604,7 @@
           <p:cNvPr id="38" name="Picture 37">
             <a:extLst>
               <a:ext uri="{FF2B5EF4-FFF2-40B4-BE49-F238E27FC236}">
-                <a16:creationId xmlns:a16="http://schemas.microsoft.com/office/drawing/2014/main" xmlns="" id="{B4EE7BA3-3882-054B-9C71-4C6C9D45BBC3}"/>
+                <a16:creationId xmlns="" xmlns:a16="http://schemas.microsoft.com/office/drawing/2014/main" id="{B4EE7BA3-3882-054B-9C71-4C6C9D45BBC3}"/>
               </a:ext>
             </a:extLst>
           </p:cNvPr>
@@ -12640,7 +12640,7 @@
           <p:cNvPr id="63" name="Hexagon 5">
             <a:extLst>
               <a:ext uri="{FF2B5EF4-FFF2-40B4-BE49-F238E27FC236}">
-                <a16:creationId xmlns:a16="http://schemas.microsoft.com/office/drawing/2014/main" xmlns="" id="{364503C3-2EEB-304D-8F5A-656CAD26AC38}"/>
+                <a16:creationId xmlns="" xmlns:a16="http://schemas.microsoft.com/office/drawing/2014/main" id="{364503C3-2EEB-304D-8F5A-656CAD26AC38}"/>
               </a:ext>
             </a:extLst>
           </p:cNvPr>
@@ -12910,7 +12910,7 @@
           <p:cNvPr id="64" name="Picture 63">
             <a:extLst>
               <a:ext uri="{FF2B5EF4-FFF2-40B4-BE49-F238E27FC236}">
-                <a16:creationId xmlns:a16="http://schemas.microsoft.com/office/drawing/2014/main" xmlns="" id="{6241EA04-8B95-A04D-BFAA-ECA5355B2F83}"/>
+                <a16:creationId xmlns="" xmlns:a16="http://schemas.microsoft.com/office/drawing/2014/main" id="{6241EA04-8B95-A04D-BFAA-ECA5355B2F83}"/>
               </a:ext>
             </a:extLst>
           </p:cNvPr>
@@ -12947,7 +12947,7 @@
             <a:hlinkClick r:id="rId12"/>
             <a:extLst>
               <a:ext uri="{FF2B5EF4-FFF2-40B4-BE49-F238E27FC236}">
-                <a16:creationId xmlns:a16="http://schemas.microsoft.com/office/drawing/2014/main" xmlns="" id="{242972D4-E45D-4C48-98B1-E9B8928925A8}"/>
+                <a16:creationId xmlns="" xmlns:a16="http://schemas.microsoft.com/office/drawing/2014/main" id="{242972D4-E45D-4C48-98B1-E9B8928925A8}"/>
               </a:ext>
             </a:extLst>
           </p:cNvPr>
@@ -13010,7 +13010,7 @@
           <p:cNvPr id="68" name="Content Placeholder 52">
             <a:extLst>
               <a:ext uri="{FF2B5EF4-FFF2-40B4-BE49-F238E27FC236}">
-                <a16:creationId xmlns:a16="http://schemas.microsoft.com/office/drawing/2014/main" xmlns="" id="{B59D4673-E8B1-2C49-81BA-06195A220AB1}"/>
+                <a16:creationId xmlns="" xmlns:a16="http://schemas.microsoft.com/office/drawing/2014/main" id="{B59D4673-E8B1-2C49-81BA-06195A220AB1}"/>
               </a:ext>
             </a:extLst>
           </p:cNvPr>
@@ -13216,7 +13216,7 @@
             <a:hlinkClick r:id="rId12"/>
             <a:extLst>
               <a:ext uri="{FF2B5EF4-FFF2-40B4-BE49-F238E27FC236}">
-                <a16:creationId xmlns:a16="http://schemas.microsoft.com/office/drawing/2014/main" xmlns="" id="{E8323CE4-5234-8142-9DE4-A809DB291451}"/>
+                <a16:creationId xmlns="" xmlns:a16="http://schemas.microsoft.com/office/drawing/2014/main" id="{E8323CE4-5234-8142-9DE4-A809DB291451}"/>
               </a:ext>
             </a:extLst>
           </p:cNvPr>
@@ -13275,7 +13275,7 @@
             <a:hlinkClick r:id="rId3"/>
             <a:extLst>
               <a:ext uri="{FF2B5EF4-FFF2-40B4-BE49-F238E27FC236}">
-                <a16:creationId xmlns:a16="http://schemas.microsoft.com/office/drawing/2014/main" xmlns="" id="{6C78789D-668C-3346-9A82-AE9B686AF055}"/>
+                <a16:creationId xmlns="" xmlns:a16="http://schemas.microsoft.com/office/drawing/2014/main" id="{6C78789D-668C-3346-9A82-AE9B686AF055}"/>
               </a:ext>
             </a:extLst>
           </p:cNvPr>
@@ -13334,7 +13334,7 @@
             <a:hlinkClick r:id="rId2"/>
             <a:extLst>
               <a:ext uri="{FF2B5EF4-FFF2-40B4-BE49-F238E27FC236}">
-                <a16:creationId xmlns:a16="http://schemas.microsoft.com/office/drawing/2014/main" xmlns="" id="{B054C5B9-06BF-FE44-99FF-F2FA5C20AC60}"/>
+                <a16:creationId xmlns="" xmlns:a16="http://schemas.microsoft.com/office/drawing/2014/main" id="{B054C5B9-06BF-FE44-99FF-F2FA5C20AC60}"/>
               </a:ext>
             </a:extLst>
           </p:cNvPr>
@@ -15574,7 +15574,7 @@
           <p:cNvPr id="14" name="Slide Number Placeholder 5">
             <a:extLst>
               <a:ext uri="{FF2B5EF4-FFF2-40B4-BE49-F238E27FC236}">
-                <a16:creationId xmlns:a16="http://schemas.microsoft.com/office/drawing/2014/main" xmlns="" id="{D6A5EA0A-9DA9-564F-8F7D-CF263DB84C39}"/>
+                <a16:creationId xmlns="" xmlns:a16="http://schemas.microsoft.com/office/drawing/2014/main" id="{D6A5EA0A-9DA9-564F-8F7D-CF263DB84C39}"/>
               </a:ext>
             </a:extLst>
           </p:cNvPr>
@@ -15712,7 +15712,7 @@
           <p:cNvPr id="21" name="Straight Connector 20">
             <a:extLst>
               <a:ext uri="{FF2B5EF4-FFF2-40B4-BE49-F238E27FC236}">
-                <a16:creationId xmlns:a16="http://schemas.microsoft.com/office/drawing/2014/main" xmlns="" id="{F4443C96-B82D-F449-A71B-02134B6BB207}"/>
+                <a16:creationId xmlns="" xmlns:a16="http://schemas.microsoft.com/office/drawing/2014/main" id="{F4443C96-B82D-F449-A71B-02134B6BB207}"/>
               </a:ext>
             </a:extLst>
           </p:cNvPr>
@@ -15798,7 +15798,7 @@
           <p:cNvPr id="6" name="Picture 5">
             <a:extLst>
               <a:ext uri="{FF2B5EF4-FFF2-40B4-BE49-F238E27FC236}">
-                <a16:creationId xmlns:a16="http://schemas.microsoft.com/office/drawing/2014/main" xmlns="" id="{FFB611C2-DDCE-7F48-9E56-C0AF82F39DC1}"/>
+                <a16:creationId xmlns="" xmlns:a16="http://schemas.microsoft.com/office/drawing/2014/main" id="{FFB611C2-DDCE-7F48-9E56-C0AF82F39DC1}"/>
               </a:ext>
             </a:extLst>
           </p:cNvPr>
@@ -16331,11 +16331,7 @@
           <a:p>
             <a:r>
               <a:rPr lang="en-US" dirty="0" smtClean="0"/>
-              <a:t>Overview </a:t>
-            </a:r>
-            <a:r>
-              <a:rPr lang="en-US" dirty="0" smtClean="0"/>
-              <a:t>(Custom)</a:t>
+              <a:t>Overview (Custom)</a:t>
             </a:r>
             <a:endParaRPr lang="en-US" dirty="0"/>
           </a:p>
@@ -16435,7 +16431,7 @@
           <p:cNvPr id="19" name="Group 18">
             <a:extLst>
               <a:ext uri="{FF2B5EF4-FFF2-40B4-BE49-F238E27FC236}">
-                <a16:creationId xmlns:a16="http://schemas.microsoft.com/office/drawing/2014/main" xmlns="" id="{15BC43EA-EC65-9B4E-800D-0F0DF0929470}"/>
+                <a16:creationId xmlns="" xmlns:a16="http://schemas.microsoft.com/office/drawing/2014/main" id="{15BC43EA-EC65-9B4E-800D-0F0DF0929470}"/>
               </a:ext>
             </a:extLst>
           </p:cNvPr>
@@ -16455,7 +16451,7 @@
             <p:cNvPr id="20" name="Picture 19">
               <a:extLst>
                 <a:ext uri="{FF2B5EF4-FFF2-40B4-BE49-F238E27FC236}">
-                  <a16:creationId xmlns:a16="http://schemas.microsoft.com/office/drawing/2014/main" xmlns="" id="{33D843E7-E97C-394E-B834-687499FC1D14}"/>
+                  <a16:creationId xmlns="" xmlns:a16="http://schemas.microsoft.com/office/drawing/2014/main" id="{33D843E7-E97C-394E-B834-687499FC1D14}"/>
                 </a:ext>
               </a:extLst>
             </p:cNvPr>
@@ -16492,7 +16488,7 @@
             <p:cNvPr id="21" name="Picture 20">
               <a:extLst>
                 <a:ext uri="{FF2B5EF4-FFF2-40B4-BE49-F238E27FC236}">
-                  <a16:creationId xmlns:a16="http://schemas.microsoft.com/office/drawing/2014/main" xmlns="" id="{62FF445E-CBEC-7446-878C-D56FDB709BE5}"/>
+                  <a16:creationId xmlns="" xmlns:a16="http://schemas.microsoft.com/office/drawing/2014/main" id="{62FF445E-CBEC-7446-878C-D56FDB709BE5}"/>
                 </a:ext>
               </a:extLst>
             </p:cNvPr>
@@ -16535,7 +16531,7 @@
             <p:cNvPr id="22" name="Rectangle 21">
               <a:extLst>
                 <a:ext uri="{FF2B5EF4-FFF2-40B4-BE49-F238E27FC236}">
-                  <a16:creationId xmlns:a16="http://schemas.microsoft.com/office/drawing/2014/main" xmlns="" id="{2EDF0AB2-C32D-D543-9E57-25F96D93E28B}"/>
+                  <a16:creationId xmlns="" xmlns:a16="http://schemas.microsoft.com/office/drawing/2014/main" id="{2EDF0AB2-C32D-D543-9E57-25F96D93E28B}"/>
                 </a:ext>
               </a:extLst>
             </p:cNvPr>
@@ -16616,7 +16612,7 @@
           <p:cNvPr id="23" name="Oval 22">
             <a:extLst>
               <a:ext uri="{FF2B5EF4-FFF2-40B4-BE49-F238E27FC236}">
-                <a16:creationId xmlns:a16="http://schemas.microsoft.com/office/drawing/2014/main" xmlns="" id="{1738B30C-7F19-6540-929D-76AF6C73BEF4}"/>
+                <a16:creationId xmlns="" xmlns:a16="http://schemas.microsoft.com/office/drawing/2014/main" id="{1738B30C-7F19-6540-929D-76AF6C73BEF4}"/>
               </a:ext>
             </a:extLst>
           </p:cNvPr>
@@ -16720,18 +16716,7 @@
                 <a:ea typeface="Source Sans Pro Light" charset="0"/>
                 <a:cs typeface="Source Sans Pro Light" charset="0"/>
               </a:rPr>
-              <a:t>bytes </a:t>
-            </a:r>
-            <a:r>
-              <a:rPr lang="en-US" sz="1400" dirty="0" smtClean="0">
-                <a:solidFill>
-                  <a:schemeClr val="tx2"/>
-                </a:solidFill>
-                <a:latin typeface="Source Sans Pro Light" charset="0"/>
-                <a:ea typeface="Source Sans Pro Light" charset="0"/>
-                <a:cs typeface="Source Sans Pro Light" charset="0"/>
-              </a:rPr>
-              <a:t>stream</a:t>
+              <a:t>bytes stream</a:t>
             </a:r>
           </a:p>
           <a:p>
@@ -16796,17 +16781,6 @@
               </a:rPr>
               <a:t> </a:t>
             </a:r>
-            <a:endParaRPr lang="en-US" sz="1400" b="0" i="0" spc="0" dirty="0" smtClean="0">
-              <a:ln>
-                <a:noFill/>
-              </a:ln>
-              <a:solidFill>
-                <a:schemeClr val="tx2"/>
-              </a:solidFill>
-              <a:latin typeface="Source Sans Pro Light" charset="0"/>
-              <a:ea typeface="Source Sans Pro Light" charset="0"/>
-              <a:cs typeface="Source Sans Pro Light" charset="0"/>
-            </a:endParaRPr>
           </a:p>
         </p:txBody>
       </p:sp>
@@ -16815,7 +16789,7 @@
           <p:cNvPr id="35" name="Oval 34">
             <a:extLst>
               <a:ext uri="{FF2B5EF4-FFF2-40B4-BE49-F238E27FC236}">
-                <a16:creationId xmlns:a16="http://schemas.microsoft.com/office/drawing/2014/main" xmlns="" id="{D23C6353-F2C3-EA4A-9C2E-DAB87E982EFE}"/>
+                <a16:creationId xmlns="" xmlns:a16="http://schemas.microsoft.com/office/drawing/2014/main" id="{D23C6353-F2C3-EA4A-9C2E-DAB87E982EFE}"/>
               </a:ext>
             </a:extLst>
           </p:cNvPr>
@@ -16919,18 +16893,7 @@
                 <a:ea typeface="Source Sans Pro Light" charset="0"/>
                 <a:cs typeface="Source Sans Pro Light" charset="0"/>
               </a:rPr>
-              <a:t>code </a:t>
-            </a:r>
-            <a:r>
-              <a:rPr lang="en-US" sz="1400" dirty="0" smtClean="0">
-                <a:solidFill>
-                  <a:schemeClr val="tx2"/>
-                </a:solidFill>
-                <a:latin typeface="Source Sans Pro Light" charset="0"/>
-                <a:ea typeface="Source Sans Pro Light" charset="0"/>
-                <a:cs typeface="Source Sans Pro Light" charset="0"/>
-              </a:rPr>
-              <a:t>to </a:t>
+              <a:t>code to </a:t>
             </a:r>
             <a:r>
               <a:rPr lang="en-US" sz="1400" b="0" i="0" spc="0" dirty="0" smtClean="0">
@@ -16954,7 +16917,7 @@
           <p:cNvPr id="42" name="Oval 41">
             <a:extLst>
               <a:ext uri="{FF2B5EF4-FFF2-40B4-BE49-F238E27FC236}">
-                <a16:creationId xmlns:a16="http://schemas.microsoft.com/office/drawing/2014/main" xmlns="" id="{8F099C04-5029-5348-BB2C-AE4DBD46822A}"/>
+                <a16:creationId xmlns="" xmlns:a16="http://schemas.microsoft.com/office/drawing/2014/main" id="{8F099C04-5029-5348-BB2C-AE4DBD46822A}"/>
               </a:ext>
             </a:extLst>
           </p:cNvPr>
@@ -17013,7 +16976,7 @@
           <p:cNvPr id="59" name="Oval 58">
             <a:extLst>
               <a:ext uri="{FF2B5EF4-FFF2-40B4-BE49-F238E27FC236}">
-                <a16:creationId xmlns:a16="http://schemas.microsoft.com/office/drawing/2014/main" xmlns="" id="{B3D45ACB-CDD7-3649-B617-C4CB39FF3D83}"/>
+                <a16:creationId xmlns="" xmlns:a16="http://schemas.microsoft.com/office/drawing/2014/main" id="{B3D45ACB-CDD7-3649-B617-C4CB39FF3D83}"/>
               </a:ext>
             </a:extLst>
           </p:cNvPr>
@@ -17409,7 +17372,7 @@
           <p:cNvPr id="51" name="Picture 50">
             <a:extLst>
               <a:ext uri="{FF2B5EF4-FFF2-40B4-BE49-F238E27FC236}">
-                <a16:creationId xmlns:lc="http://schemas.openxmlformats.org/drawingml/2006/lockedCanvas" xmlns="" xmlns:a16="http://schemas.microsoft.com/office/drawing/2014/main" id="{C660ED45-6EB0-FA48-913F-338BE9D253C7}"/>
+                <a16:creationId xmlns:a16="http://schemas.microsoft.com/office/drawing/2014/main" xmlns="" xmlns:lc="http://schemas.openxmlformats.org/drawingml/2006/lockedCanvas" id="{C660ED45-6EB0-FA48-913F-338BE9D253C7}"/>
               </a:ext>
             </a:extLst>
           </p:cNvPr>
@@ -17927,7 +17890,7 @@
           <p:cNvPr id="12" name="TextBox 25">
             <a:extLst>
               <a:ext uri="{FF2B5EF4-FFF2-40B4-BE49-F238E27FC236}">
-                <a16:creationId xmlns="" xmlns:a16="http://schemas.microsoft.com/office/drawing/2014/main" xmlns:lc="http://schemas.openxmlformats.org/drawingml/2006/lockedCanvas" id="{02FBA541-B7B7-48BA-8F04-E0D53532B862}"/>
+                <a16:creationId xmlns:lc="http://schemas.openxmlformats.org/drawingml/2006/lockedCanvas" xmlns:a16="http://schemas.microsoft.com/office/drawing/2014/main" xmlns="" id="{02FBA541-B7B7-48BA-8F04-E0D53532B862}"/>
               </a:ext>
             </a:extLst>
           </p:cNvPr>
@@ -18068,7 +18031,7 @@
           <p:cNvPr id="13" name="TextBox 25">
             <a:extLst>
               <a:ext uri="{FF2B5EF4-FFF2-40B4-BE49-F238E27FC236}">
-                <a16:creationId xmlns="" xmlns:a16="http://schemas.microsoft.com/office/drawing/2014/main" xmlns:lc="http://schemas.openxmlformats.org/drawingml/2006/lockedCanvas" id="{02FBA541-B7B7-48BA-8F04-E0D53532B862}"/>
+                <a16:creationId xmlns:lc="http://schemas.openxmlformats.org/drawingml/2006/lockedCanvas" xmlns:a16="http://schemas.microsoft.com/office/drawing/2014/main" xmlns="" id="{02FBA541-B7B7-48BA-8F04-E0D53532B862}"/>
               </a:ext>
             </a:extLst>
           </p:cNvPr>
@@ -18932,25 +18895,16 @@
           <a:p>
             <a:r>
               <a:rPr lang="en-US" dirty="0" smtClean="0"/>
-              <a:t>Overview </a:t>
-            </a:r>
-            <a:r>
-              <a:rPr lang="en-US" dirty="0" smtClean="0"/>
-              <a:t>(In-</a:t>
+              <a:t>Overview (In-</a:t>
             </a:r>
             <a:r>
               <a:rPr lang="en-US" dirty="0" err="1" smtClean="0"/>
-              <a:t>Plac</a:t>
-            </a:r>
-            <a:r>
-              <a:rPr lang="en-US" dirty="0" err="1" smtClean="0"/>
-              <a:t>E</a:t>
+              <a:t>PlacE</a:t>
             </a:r>
             <a:r>
               <a:rPr lang="en-US" dirty="0"/>
               <a:t>)</a:t>
             </a:r>
-            <a:endParaRPr lang="en-US" dirty="0"/>
           </a:p>
         </p:txBody>
       </p:sp>
@@ -19048,7 +19002,7 @@
           <p:cNvPr id="19" name="Group 18">
             <a:extLst>
               <a:ext uri="{FF2B5EF4-FFF2-40B4-BE49-F238E27FC236}">
-                <a16:creationId xmlns:a16="http://schemas.microsoft.com/office/drawing/2014/main" xmlns="" id="{15BC43EA-EC65-9B4E-800D-0F0DF0929470}"/>
+                <a16:creationId xmlns="" xmlns:a16="http://schemas.microsoft.com/office/drawing/2014/main" id="{15BC43EA-EC65-9B4E-800D-0F0DF0929470}"/>
               </a:ext>
             </a:extLst>
           </p:cNvPr>
@@ -19068,7 +19022,7 @@
             <p:cNvPr id="20" name="Picture 19">
               <a:extLst>
                 <a:ext uri="{FF2B5EF4-FFF2-40B4-BE49-F238E27FC236}">
-                  <a16:creationId xmlns:a16="http://schemas.microsoft.com/office/drawing/2014/main" xmlns="" id="{33D843E7-E97C-394E-B834-687499FC1D14}"/>
+                  <a16:creationId xmlns="" xmlns:a16="http://schemas.microsoft.com/office/drawing/2014/main" id="{33D843E7-E97C-394E-B834-687499FC1D14}"/>
                 </a:ext>
               </a:extLst>
             </p:cNvPr>
@@ -19105,7 +19059,7 @@
             <p:cNvPr id="21" name="Picture 20">
               <a:extLst>
                 <a:ext uri="{FF2B5EF4-FFF2-40B4-BE49-F238E27FC236}">
-                  <a16:creationId xmlns:a16="http://schemas.microsoft.com/office/drawing/2014/main" xmlns="" id="{62FF445E-CBEC-7446-878C-D56FDB709BE5}"/>
+                  <a16:creationId xmlns="" xmlns:a16="http://schemas.microsoft.com/office/drawing/2014/main" id="{62FF445E-CBEC-7446-878C-D56FDB709BE5}"/>
                 </a:ext>
               </a:extLst>
             </p:cNvPr>
@@ -19148,7 +19102,7 @@
             <p:cNvPr id="22" name="Rectangle 21">
               <a:extLst>
                 <a:ext uri="{FF2B5EF4-FFF2-40B4-BE49-F238E27FC236}">
-                  <a16:creationId xmlns:a16="http://schemas.microsoft.com/office/drawing/2014/main" xmlns="" id="{2EDF0AB2-C32D-D543-9E57-25F96D93E28B}"/>
+                  <a16:creationId xmlns="" xmlns:a16="http://schemas.microsoft.com/office/drawing/2014/main" id="{2EDF0AB2-C32D-D543-9E57-25F96D93E28B}"/>
                 </a:ext>
               </a:extLst>
             </p:cNvPr>
@@ -19229,7 +19183,7 @@
           <p:cNvPr id="23" name="Oval 22">
             <a:extLst>
               <a:ext uri="{FF2B5EF4-FFF2-40B4-BE49-F238E27FC236}">
-                <a16:creationId xmlns:a16="http://schemas.microsoft.com/office/drawing/2014/main" xmlns="" id="{1738B30C-7F19-6540-929D-76AF6C73BEF4}"/>
+                <a16:creationId xmlns="" xmlns:a16="http://schemas.microsoft.com/office/drawing/2014/main" id="{1738B30C-7F19-6540-929D-76AF6C73BEF4}"/>
               </a:ext>
             </a:extLst>
           </p:cNvPr>
@@ -19288,7 +19242,7 @@
           <p:cNvPr id="35" name="Oval 34">
             <a:extLst>
               <a:ext uri="{FF2B5EF4-FFF2-40B4-BE49-F238E27FC236}">
-                <a16:creationId xmlns:a16="http://schemas.microsoft.com/office/drawing/2014/main" xmlns="" id="{D23C6353-F2C3-EA4A-9C2E-DAB87E982EFE}"/>
+                <a16:creationId xmlns="" xmlns:a16="http://schemas.microsoft.com/office/drawing/2014/main" id="{D23C6353-F2C3-EA4A-9C2E-DAB87E982EFE}"/>
               </a:ext>
             </a:extLst>
           </p:cNvPr>
@@ -19612,7 +19566,7 @@
           <p:cNvPr id="51" name="Picture 50">
             <a:extLst>
               <a:ext uri="{FF2B5EF4-FFF2-40B4-BE49-F238E27FC236}">
-                <a16:creationId xmlns:lc="http://schemas.openxmlformats.org/drawingml/2006/lockedCanvas" xmlns="" xmlns:a16="http://schemas.microsoft.com/office/drawing/2014/main" id="{C660ED45-6EB0-FA48-913F-338BE9D253C7}"/>
+                <a16:creationId xmlns:a16="http://schemas.microsoft.com/office/drawing/2014/main" xmlns="" xmlns:lc="http://schemas.openxmlformats.org/drawingml/2006/lockedCanvas" id="{C660ED45-6EB0-FA48-913F-338BE9D253C7}"/>
               </a:ext>
             </a:extLst>
           </p:cNvPr>
@@ -19841,8 +19795,8 @@
         </p:nvSpPr>
         <p:spPr>
           <a:xfrm>
-            <a:off x="2470330" y="1822452"/>
-            <a:ext cx="4463870" cy="828220"/>
+            <a:off x="1313793" y="1822452"/>
+            <a:ext cx="5620407" cy="828220"/>
           </a:xfrm>
           <a:prstGeom prst="roundRect">
             <a:avLst>
@@ -20065,8 +20019,8 @@
         </p:nvSpPr>
         <p:spPr>
           <a:xfrm>
-            <a:off x="2538666" y="1953365"/>
-            <a:ext cx="2176567" cy="557115"/>
+            <a:off x="1387366" y="1953365"/>
+            <a:ext cx="3327867" cy="557115"/>
           </a:xfrm>
           <a:prstGeom prst="roundRect">
             <a:avLst>
@@ -20214,7 +20168,7 @@
           <a:p>
             <a:pPr algn="ctr"/>
             <a:r>
-              <a:rPr lang="en-US" sz="1200" b="1" i="1" dirty="0" smtClean="0">
+              <a:rPr lang="en-US" sz="1200" b="1" i="1" dirty="0">
                 <a:solidFill>
                   <a:schemeClr val="bg1"/>
                 </a:solidFill>
@@ -20222,7 +20176,29 @@
                 <a:ea typeface="Source Sans Pro Light" charset="0"/>
                 <a:cs typeface="Source Sans Pro Light" charset="0"/>
               </a:rPr>
-              <a:t>(Code and Resources)</a:t>
+              <a:t>(code , </a:t>
+            </a:r>
+            <a:r>
+              <a:rPr lang="en-US" sz="1200" b="1" i="1" dirty="0" smtClean="0">
+                <a:solidFill>
+                  <a:schemeClr val="bg1"/>
+                </a:solidFill>
+                <a:latin typeface="Source Sans Pro Light" charset="0"/>
+                <a:ea typeface="Source Sans Pro Light" charset="0"/>
+                <a:cs typeface="Source Sans Pro Light" charset="0"/>
+              </a:rPr>
+              <a:t>resources, static </a:t>
+            </a:r>
+            <a:r>
+              <a:rPr lang="en-US" sz="1200" b="1" i="1" dirty="0">
+                <a:solidFill>
+                  <a:schemeClr val="bg1"/>
+                </a:solidFill>
+                <a:latin typeface="Source Sans Pro Light" charset="0"/>
+                <a:ea typeface="Source Sans Pro Light" charset="0"/>
+                <a:cs typeface="Source Sans Pro Light" charset="0"/>
+              </a:rPr>
+              <a:t>fields &amp; internal structures)</a:t>
             </a:r>
             <a:endParaRPr lang="en-US" sz="1200" b="1" i="1" dirty="0">
               <a:solidFill>
@@ -20240,7 +20216,7 @@
           <p:cNvPr id="12" name="TextBox 25">
             <a:extLst>
               <a:ext uri="{FF2B5EF4-FFF2-40B4-BE49-F238E27FC236}">
-                <a16:creationId xmlns="" xmlns:a16="http://schemas.microsoft.com/office/drawing/2014/main" xmlns:lc="http://schemas.openxmlformats.org/drawingml/2006/lockedCanvas" id="{02FBA541-B7B7-48BA-8F04-E0D53532B862}"/>
+                <a16:creationId xmlns:lc="http://schemas.openxmlformats.org/drawingml/2006/lockedCanvas" xmlns:a16="http://schemas.microsoft.com/office/drawing/2014/main" xmlns="" id="{02FBA541-B7B7-48BA-8F04-E0D53532B862}"/>
               </a:ext>
             </a:extLst>
           </p:cNvPr>
@@ -20381,7 +20357,7 @@
           <p:cNvPr id="13" name="TextBox 25">
             <a:extLst>
               <a:ext uri="{FF2B5EF4-FFF2-40B4-BE49-F238E27FC236}">
-                <a16:creationId xmlns="" xmlns:a16="http://schemas.microsoft.com/office/drawing/2014/main" xmlns:lc="http://schemas.openxmlformats.org/drawingml/2006/lockedCanvas" id="{02FBA541-B7B7-48BA-8F04-E0D53532B862}"/>
+                <a16:creationId xmlns:lc="http://schemas.openxmlformats.org/drawingml/2006/lockedCanvas" xmlns:a16="http://schemas.microsoft.com/office/drawing/2014/main" xmlns="" id="{02FBA541-B7B7-48BA-8F04-E0D53532B862}"/>
               </a:ext>
             </a:extLst>
           </p:cNvPr>
@@ -20525,8 +20501,8 @@
         </p:nvSpPr>
         <p:spPr>
           <a:xfrm>
-            <a:off x="2470330" y="2824741"/>
-            <a:ext cx="4463870" cy="828220"/>
+            <a:off x="1313793" y="2824741"/>
+            <a:ext cx="5620407" cy="828220"/>
           </a:xfrm>
           <a:prstGeom prst="roundRect">
             <a:avLst>
@@ -20764,8 +20740,8 @@
         </p:nvSpPr>
         <p:spPr>
           <a:xfrm>
-            <a:off x="2538664" y="2962735"/>
-            <a:ext cx="2176569" cy="550034"/>
+            <a:off x="1389010" y="2980538"/>
+            <a:ext cx="2710024" cy="550034"/>
           </a:xfrm>
           <a:prstGeom prst="roundRect">
             <a:avLst>
@@ -20886,8 +20862,8 @@
         </p:nvSpPr>
         <p:spPr>
           <a:xfrm>
-            <a:off x="4789130" y="2962735"/>
-            <a:ext cx="2059584" cy="550034"/>
+            <a:off x="4160783" y="2980538"/>
+            <a:ext cx="2711668" cy="550034"/>
           </a:xfrm>
           <a:prstGeom prst="roundRect">
             <a:avLst>

</xml_diff>